<commit_message>
updated notes on income tax
</commit_message>
<xml_diff>
--- a/docs/images/income/income.pptx
+++ b/docs/images/income/income.pptx
@@ -215,7 +215,7 @@
           <a:p>
             <a:fld id="{4520374D-A10D-4F16-A346-D54563820891}" type="datetimeFigureOut">
               <a:rPr lang="en-MY" smtClean="0"/>
-              <a:t>10/4/2020</a:t>
+              <a:t>16/1/2022</a:t>
             </a:fld>
             <a:endParaRPr lang="en-MY"/>
           </a:p>
@@ -653,7 +653,7 @@
           <a:p>
             <a:fld id="{48A87A34-81AB-432B-8DAE-1953F412C126}" type="datetimeFigureOut">
               <a:rPr lang="en-US" dirty="0"/>
-              <a:t>4/10/2020</a:t>
+              <a:t>1/16/2022</a:t>
             </a:fld>
             <a:endParaRPr lang="en-US" dirty="0"/>
           </a:p>
@@ -915,7 +915,7 @@
           <a:p>
             <a:fld id="{48A87A34-81AB-432B-8DAE-1953F412C126}" type="datetimeFigureOut">
               <a:rPr lang="en-US" dirty="0"/>
-              <a:t>4/10/2020</a:t>
+              <a:t>1/16/2022</a:t>
             </a:fld>
             <a:endParaRPr lang="en-US" dirty="0"/>
           </a:p>
@@ -1142,7 +1142,7 @@
             <a:fld id="{48A87A34-81AB-432B-8DAE-1953F412C126}" type="datetimeFigureOut">
               <a:rPr lang="en-US" dirty="0"/>
               <a:pPr/>
-              <a:t>4/10/2020</a:t>
+              <a:t>1/16/2022</a:t>
             </a:fld>
             <a:endParaRPr lang="en-US" dirty="0"/>
           </a:p>
@@ -1448,7 +1448,7 @@
             <a:fld id="{48A87A34-81AB-432B-8DAE-1953F412C126}" type="datetimeFigureOut">
               <a:rPr lang="en-US" dirty="0"/>
               <a:pPr/>
-              <a:t>4/10/2020</a:t>
+              <a:t>1/16/2022</a:t>
             </a:fld>
             <a:endParaRPr lang="en-US" dirty="0"/>
           </a:p>
@@ -1917,7 +1917,7 @@
             <a:fld id="{48A87A34-81AB-432B-8DAE-1953F412C126}" type="datetimeFigureOut">
               <a:rPr lang="en-US" dirty="0"/>
               <a:pPr/>
-              <a:t>4/10/2020</a:t>
+              <a:t>1/16/2022</a:t>
             </a:fld>
             <a:endParaRPr lang="en-US" dirty="0"/>
           </a:p>
@@ -2459,7 +2459,7 @@
           <a:p>
             <a:fld id="{48A87A34-81AB-432B-8DAE-1953F412C126}" type="datetimeFigureOut">
               <a:rPr lang="en-US" dirty="0"/>
-              <a:t>4/10/2020</a:t>
+              <a:t>1/16/2022</a:t>
             </a:fld>
             <a:endParaRPr lang="en-US" dirty="0"/>
           </a:p>
@@ -3228,7 +3228,7 @@
           <a:p>
             <a:fld id="{48A87A34-81AB-432B-8DAE-1953F412C126}" type="datetimeFigureOut">
               <a:rPr lang="en-US" dirty="0"/>
-              <a:t>4/10/2020</a:t>
+              <a:t>1/16/2022</a:t>
             </a:fld>
             <a:endParaRPr lang="en-US" dirty="0"/>
           </a:p>
@@ -3398,7 +3398,7 @@
           <a:p>
             <a:fld id="{48A87A34-81AB-432B-8DAE-1953F412C126}" type="datetimeFigureOut">
               <a:rPr lang="en-US" dirty="0"/>
-              <a:t>4/10/2020</a:t>
+              <a:t>1/16/2022</a:t>
             </a:fld>
             <a:endParaRPr lang="en-US" dirty="0"/>
           </a:p>
@@ -3617,7 +3617,7 @@
             <a:fld id="{48A87A34-81AB-432B-8DAE-1953F412C126}" type="datetimeFigureOut">
               <a:rPr lang="en-US" dirty="0"/>
               <a:pPr/>
-              <a:t>4/10/2020</a:t>
+              <a:t>1/16/2022</a:t>
             </a:fld>
             <a:endParaRPr lang="en-US" dirty="0"/>
           </a:p>
@@ -3853,7 +3853,7 @@
           <a:p>
             <a:fld id="{48A87A34-81AB-432B-8DAE-1953F412C126}" type="datetimeFigureOut">
               <a:rPr lang="en-US" smtClean="0"/>
-              <a:t>4/10/2020</a:t>
+              <a:t>1/16/2022</a:t>
             </a:fld>
             <a:endParaRPr lang="en-US" dirty="0"/>
           </a:p>
@@ -4033,7 +4033,7 @@
           <a:p>
             <a:fld id="{48A87A34-81AB-432B-8DAE-1953F412C126}" type="datetimeFigureOut">
               <a:rPr lang="en-US" smtClean="0"/>
-              <a:t>4/10/2020</a:t>
+              <a:t>1/16/2022</a:t>
             </a:fld>
             <a:endParaRPr lang="en-US" dirty="0"/>
           </a:p>
@@ -4203,7 +4203,7 @@
           <a:p>
             <a:fld id="{48A87A34-81AB-432B-8DAE-1953F412C126}" type="datetimeFigureOut">
               <a:rPr lang="en-US" dirty="0"/>
-              <a:t>4/10/2020</a:t>
+              <a:t>1/16/2022</a:t>
             </a:fld>
             <a:endParaRPr lang="en-US" dirty="0"/>
           </a:p>
@@ -4488,7 +4488,7 @@
             <a:fld id="{48A87A34-81AB-432B-8DAE-1953F412C126}" type="datetimeFigureOut">
               <a:rPr lang="en-US" smtClean="0"/>
               <a:pPr/>
-              <a:t>4/10/2020</a:t>
+              <a:t>1/16/2022</a:t>
             </a:fld>
             <a:endParaRPr lang="en-US" dirty="0"/>
           </a:p>
@@ -4730,7 +4730,7 @@
           <a:p>
             <a:fld id="{48A87A34-81AB-432B-8DAE-1953F412C126}" type="datetimeFigureOut">
               <a:rPr lang="en-US" smtClean="0"/>
-              <a:t>4/10/2020</a:t>
+              <a:t>1/16/2022</a:t>
             </a:fld>
             <a:endParaRPr lang="en-US" dirty="0"/>
           </a:p>
@@ -5109,7 +5109,7 @@
           <a:p>
             <a:fld id="{48A87A34-81AB-432B-8DAE-1953F412C126}" type="datetimeFigureOut">
               <a:rPr lang="en-US" smtClean="0"/>
-              <a:t>4/10/2020</a:t>
+              <a:t>1/16/2022</a:t>
             </a:fld>
             <a:endParaRPr lang="en-US" dirty="0"/>
           </a:p>
@@ -5227,7 +5227,7 @@
           <a:p>
             <a:fld id="{48A87A34-81AB-432B-8DAE-1953F412C126}" type="datetimeFigureOut">
               <a:rPr lang="en-US" smtClean="0"/>
-              <a:t>4/10/2020</a:t>
+              <a:t>1/16/2022</a:t>
             </a:fld>
             <a:endParaRPr lang="en-US" dirty="0"/>
           </a:p>
@@ -5322,7 +5322,7 @@
           <a:p>
             <a:fld id="{48A87A34-81AB-432B-8DAE-1953F412C126}" type="datetimeFigureOut">
               <a:rPr lang="en-US" smtClean="0"/>
-              <a:t>4/10/2020</a:t>
+              <a:t>1/16/2022</a:t>
             </a:fld>
             <a:endParaRPr lang="en-US" dirty="0"/>
           </a:p>
@@ -5571,7 +5571,7 @@
           <a:p>
             <a:fld id="{48A87A34-81AB-432B-8DAE-1953F412C126}" type="datetimeFigureOut">
               <a:rPr lang="en-US" smtClean="0"/>
-              <a:t>4/10/2020</a:t>
+              <a:t>1/16/2022</a:t>
             </a:fld>
             <a:endParaRPr lang="en-US" dirty="0"/>
           </a:p>
@@ -5828,7 +5828,7 @@
           <a:p>
             <a:fld id="{48A87A34-81AB-432B-8DAE-1953F412C126}" type="datetimeFigureOut">
               <a:rPr lang="en-US" smtClean="0"/>
-              <a:t>4/10/2020</a:t>
+              <a:t>1/16/2022</a:t>
             </a:fld>
             <a:endParaRPr lang="en-US" dirty="0"/>
           </a:p>
@@ -6085,7 +6085,7 @@
           <a:p>
             <a:fld id="{48A87A34-81AB-432B-8DAE-1953F412C126}" type="datetimeFigureOut">
               <a:rPr lang="en-US" smtClean="0"/>
-              <a:t>4/10/2020</a:t>
+              <a:t>1/16/2022</a:t>
             </a:fld>
             <a:endParaRPr lang="en-US" dirty="0"/>
           </a:p>
@@ -6317,7 +6317,7 @@
             <a:fld id="{48A87A34-81AB-432B-8DAE-1953F412C126}" type="datetimeFigureOut">
               <a:rPr lang="en-US" smtClean="0"/>
               <a:pPr/>
-              <a:t>4/10/2020</a:t>
+              <a:t>1/16/2022</a:t>
             </a:fld>
             <a:endParaRPr lang="en-US" dirty="0"/>
           </a:p>
@@ -6628,7 +6628,7 @@
             <a:fld id="{48A87A34-81AB-432B-8DAE-1953F412C126}" type="datetimeFigureOut">
               <a:rPr lang="en-US" smtClean="0"/>
               <a:pPr/>
-              <a:t>4/10/2020</a:t>
+              <a:t>1/16/2022</a:t>
             </a:fld>
             <a:endParaRPr lang="en-US" dirty="0"/>
           </a:p>
@@ -7160,7 +7160,7 @@
             <a:fld id="{48A87A34-81AB-432B-8DAE-1953F412C126}" type="datetimeFigureOut">
               <a:rPr lang="en-US" dirty="0"/>
               <a:pPr/>
-              <a:t>4/10/2020</a:t>
+              <a:t>1/16/2022</a:t>
             </a:fld>
             <a:endParaRPr lang="en-US" dirty="0"/>
           </a:p>
@@ -7397,7 +7397,7 @@
             <a:fld id="{48A87A34-81AB-432B-8DAE-1953F412C126}" type="datetimeFigureOut">
               <a:rPr lang="en-US" smtClean="0"/>
               <a:pPr/>
-              <a:t>4/10/2020</a:t>
+              <a:t>1/16/2022</a:t>
             </a:fld>
             <a:endParaRPr lang="en-US" dirty="0"/>
           </a:p>
@@ -7944,7 +7944,7 @@
           <a:p>
             <a:fld id="{48A87A34-81AB-432B-8DAE-1953F412C126}" type="datetimeFigureOut">
               <a:rPr lang="en-US" smtClean="0"/>
-              <a:t>4/10/2020</a:t>
+              <a:t>1/16/2022</a:t>
             </a:fld>
             <a:endParaRPr lang="en-US" dirty="0"/>
           </a:p>
@@ -8718,7 +8718,7 @@
           <a:p>
             <a:fld id="{48A87A34-81AB-432B-8DAE-1953F412C126}" type="datetimeFigureOut">
               <a:rPr lang="en-US" smtClean="0"/>
-              <a:t>4/10/2020</a:t>
+              <a:t>1/16/2022</a:t>
             </a:fld>
             <a:endParaRPr lang="en-US" dirty="0"/>
           </a:p>
@@ -8893,7 +8893,7 @@
           <a:p>
             <a:fld id="{48A87A34-81AB-432B-8DAE-1953F412C126}" type="datetimeFigureOut">
               <a:rPr lang="en-US" smtClean="0"/>
-              <a:t>4/10/2020</a:t>
+              <a:t>1/16/2022</a:t>
             </a:fld>
             <a:endParaRPr lang="en-US" dirty="0"/>
           </a:p>
@@ -9117,7 +9117,7 @@
             <a:fld id="{48A87A34-81AB-432B-8DAE-1953F412C126}" type="datetimeFigureOut">
               <a:rPr lang="en-US" smtClean="0"/>
               <a:pPr/>
-              <a:t>4/10/2020</a:t>
+              <a:t>1/16/2022</a:t>
             </a:fld>
             <a:endParaRPr lang="en-US" dirty="0"/>
           </a:p>
@@ -9359,7 +9359,7 @@
           <a:p>
             <a:fld id="{48A87A34-81AB-432B-8DAE-1953F412C126}" type="datetimeFigureOut">
               <a:rPr lang="en-US" dirty="0"/>
-              <a:t>4/10/2020</a:t>
+              <a:t>1/16/2022</a:t>
             </a:fld>
             <a:endParaRPr lang="en-US" dirty="0"/>
           </a:p>
@@ -9733,7 +9733,7 @@
           <a:p>
             <a:fld id="{48A87A34-81AB-432B-8DAE-1953F412C126}" type="datetimeFigureOut">
               <a:rPr lang="en-US" dirty="0"/>
-              <a:t>4/10/2020</a:t>
+              <a:t>1/16/2022</a:t>
             </a:fld>
             <a:endParaRPr lang="en-US" dirty="0"/>
           </a:p>
@@ -9846,7 +9846,7 @@
           <a:p>
             <a:fld id="{48A87A34-81AB-432B-8DAE-1953F412C126}" type="datetimeFigureOut">
               <a:rPr lang="en-US" dirty="0"/>
-              <a:t>4/10/2020</a:t>
+              <a:t>1/16/2022</a:t>
             </a:fld>
             <a:endParaRPr lang="en-US" dirty="0"/>
           </a:p>
@@ -9936,7 +9936,7 @@
           <a:p>
             <a:fld id="{48A87A34-81AB-432B-8DAE-1953F412C126}" type="datetimeFigureOut">
               <a:rPr lang="en-US" dirty="0"/>
-              <a:t>4/10/2020</a:t>
+              <a:t>1/16/2022</a:t>
             </a:fld>
             <a:endParaRPr lang="en-US" dirty="0"/>
           </a:p>
@@ -10180,7 +10180,7 @@
           <a:p>
             <a:fld id="{48A87A34-81AB-432B-8DAE-1953F412C126}" type="datetimeFigureOut">
               <a:rPr lang="en-US" dirty="0"/>
-              <a:t>4/10/2020</a:t>
+              <a:t>1/16/2022</a:t>
             </a:fld>
             <a:endParaRPr lang="en-US" dirty="0"/>
           </a:p>
@@ -10432,7 +10432,7 @@
           <a:p>
             <a:fld id="{48A87A34-81AB-432B-8DAE-1953F412C126}" type="datetimeFigureOut">
               <a:rPr lang="en-US" dirty="0"/>
-              <a:t>4/10/2020</a:t>
+              <a:t>1/16/2022</a:t>
             </a:fld>
             <a:endParaRPr lang="en-US" dirty="0"/>
           </a:p>
@@ -10675,7 +10675,7 @@
             <a:fld id="{48A87A34-81AB-432B-8DAE-1953F412C126}" type="datetimeFigureOut">
               <a:rPr lang="en-US" smtClean="0"/>
               <a:pPr/>
-              <a:t>4/10/2020</a:t>
+              <a:t>1/16/2022</a:t>
             </a:fld>
             <a:endParaRPr lang="en-US" dirty="0"/>
           </a:p>
@@ -11326,7 +11326,7 @@
             <a:fld id="{48A87A34-81AB-432B-8DAE-1953F412C126}" type="datetimeFigureOut">
               <a:rPr lang="en-US" smtClean="0"/>
               <a:pPr/>
-              <a:t>4/10/2020</a:t>
+              <a:t>1/16/2022</a:t>
             </a:fld>
             <a:endParaRPr lang="en-US" dirty="0"/>
           </a:p>
@@ -11618,7 +11618,7 @@
             <a:fld id="{48A87A34-81AB-432B-8DAE-1953F412C126}" type="datetimeFigureOut">
               <a:rPr lang="en-US" smtClean="0"/>
               <a:pPr/>
-              <a:t>4/10/2020</a:t>
+              <a:t>1/16/2022</a:t>
             </a:fld>
             <a:endParaRPr lang="en-US" dirty="0"/>
           </a:p>
@@ -18522,7 +18522,7 @@
             <p:ph sz="quarter" idx="1"/>
             <p:extLst>
               <p:ext uri="{D42A27DB-BD31-4B8C-83A1-F6EECF244321}">
-                <p14:modId xmlns:p14="http://schemas.microsoft.com/office/powerpoint/2010/main" val="1904784408"/>
+                <p14:modId xmlns:p14="http://schemas.microsoft.com/office/powerpoint/2010/main" val="156286994"/>
               </p:ext>
             </p:extLst>
           </p:nvPr>
@@ -18885,7 +18885,7 @@
                       <a:pPr algn="r"/>
                       <a:r>
                         <a:rPr lang="en-MY" sz="1400" dirty="0"/>
-                        <a:t>9,000</a:t>
+                        <a:t>4,000</a:t>
                       </a:r>
                     </a:p>
                   </a:txBody>
@@ -19207,7 +19207,7 @@
                       <a:pPr algn="r"/>
                       <a:r>
                         <a:rPr lang="en-US" sz="1400" dirty="0"/>
-                        <a:t>(42,600)</a:t>
+                        <a:t>(37,600)</a:t>
                       </a:r>
                       <a:endParaRPr lang="en-MY" sz="1400" dirty="0"/>
                     </a:p>
@@ -19270,7 +19270,7 @@
                       <a:pPr algn="r"/>
                       <a:r>
                         <a:rPr lang="en-US" sz="1400" dirty="0"/>
-                        <a:t>41,600</a:t>
+                        <a:t>46,600</a:t>
                       </a:r>
                       <a:endParaRPr lang="en-MY" sz="1400" dirty="0"/>
                     </a:p>
@@ -19302,7 +19302,7 @@
           <p:nvPr>
             <p:extLst>
               <p:ext uri="{D42A27DB-BD31-4B8C-83A1-F6EECF244321}">
-                <p14:modId xmlns:p14="http://schemas.microsoft.com/office/powerpoint/2010/main" val="3509986613"/>
+                <p14:modId xmlns:p14="http://schemas.microsoft.com/office/powerpoint/2010/main" val="3452935943"/>
               </p:ext>
             </p:extLst>
           </p:nvPr>
@@ -19474,7 +19474,7 @@
                       <a:pPr algn="r"/>
                       <a:r>
                         <a:rPr lang="en-US" sz="1400" dirty="0"/>
-                        <a:t>On the next 6,600 x 8%</a:t>
+                        <a:t>On the next 11,600 x 8%</a:t>
                       </a:r>
                       <a:endParaRPr lang="en-MY" sz="1400" dirty="0"/>
                     </a:p>
@@ -19489,7 +19489,7 @@
                       <a:pPr algn="r"/>
                       <a:r>
                         <a:rPr lang="en-US" sz="1400" dirty="0"/>
-                        <a:t>528</a:t>
+                        <a:t>928</a:t>
                       </a:r>
                       <a:endParaRPr lang="en-MY" sz="1400" dirty="0"/>
                     </a:p>
@@ -19570,7 +19570,7 @@
                       <a:pPr algn="r"/>
                       <a:r>
                         <a:rPr lang="en-US" sz="1400" dirty="0"/>
-                        <a:t>1,128</a:t>
+                        <a:t>1,528</a:t>
                       </a:r>
                       <a:endParaRPr lang="en-MY" sz="1400" dirty="0"/>
                     </a:p>
@@ -19806,7 +19806,7 @@
                       <a:pPr algn="r"/>
                       <a:r>
                         <a:rPr lang="en-US" sz="1400" dirty="0"/>
-                        <a:t>RM 628</a:t>
+                        <a:t>RM 1,028</a:t>
                       </a:r>
                       <a:endParaRPr lang="en-MY" sz="1400" dirty="0"/>
                     </a:p>
@@ -19865,7 +19865,7 @@
           <a:p>
             <a:r>
               <a:rPr lang="en-MY" dirty="0"/>
-              <a:t>Balance = 41,600 – 35,000 = 6,600 @ 8% </a:t>
+              <a:t>Balance = 46,600 – 35,000 = 11,600 @ 8% </a:t>
             </a:r>
           </a:p>
         </p:txBody>

</xml_diff>